<commit_message>
adding latest presentation from Liz
</commit_message>
<xml_diff>
--- a/DraftPresentation_AKI_HDRUK_TEAM2.pptx
+++ b/DraftPresentation_AKI_HDRUK_TEAM2.pptx
@@ -5,17 +5,19 @@
     <p:sldMasterId id="2147483648" r:id="rId1"/>
   </p:sldMasterIdLst>
   <p:notesMasterIdLst>
-    <p:notesMasterId r:id="rId10"/>
+    <p:notesMasterId r:id="rId12"/>
   </p:notesMasterIdLst>
   <p:sldIdLst>
     <p:sldId id="256" r:id="rId2"/>
     <p:sldId id="259" r:id="rId3"/>
     <p:sldId id="263" r:id="rId4"/>
     <p:sldId id="258" r:id="rId5"/>
-    <p:sldId id="262" r:id="rId6"/>
-    <p:sldId id="265" r:id="rId7"/>
-    <p:sldId id="266" r:id="rId8"/>
-    <p:sldId id="257" r:id="rId9"/>
+    <p:sldId id="267" r:id="rId6"/>
+    <p:sldId id="262" r:id="rId7"/>
+    <p:sldId id="265" r:id="rId8"/>
+    <p:sldId id="266" r:id="rId9"/>
+    <p:sldId id="268" r:id="rId10"/>
+    <p:sldId id="257" r:id="rId11"/>
   </p:sldIdLst>
   <p:sldSz cx="12192000" cy="6858000"/>
   <p:notesSz cx="6858000" cy="9144000"/>
@@ -115,14 +117,6 @@
     </a:lvl9pPr>
   </p:defaultTextStyle>
 </p:presentation>
-</file>
-
-<file path=ppt/revisionInfo.xml><?xml version="1.0" encoding="utf-8"?>
-<p1510:revInfo xmlns:a="http://schemas.openxmlformats.org/drawingml/2006/main" xmlns:r="http://schemas.openxmlformats.org/officeDocument/2006/relationships" xmlns:p1510="http://schemas.microsoft.com/office/powerpoint/2015/10/main">
-  <p1510:revLst>
-    <p1510:client id="{50528678-1D03-43EC-8EB7-060DB1B42855}" v="2" dt="2020-12-10T12:48:56.140"/>
-  </p1510:revLst>
-</p1510:revInfo>
 </file>
 
 <file path=ppt/notesMasters/notesMaster1.xml><?xml version="1.0" encoding="utf-8"?>
@@ -1109,46 +1103,6 @@
           <a:bodyPr/>
           <a:lstStyle/>
           <a:p>
-            <a:pPr marL="285750" indent="-285750">
-              <a:buFont typeface="Arial" panose="020B0604020202020204" pitchFamily="34" charset="0"/>
-              <a:buChar char="•"/>
-            </a:pPr>
-            <a:r>
-              <a:rPr lang="en-GB" sz="1200" dirty="0"/>
-              <a:t>The dataset will include one creatinine reading per patient per day. </a:t>
-            </a:r>
-          </a:p>
-          <a:p>
-            <a:pPr marL="285750" indent="-285750">
-              <a:buFont typeface="Arial" panose="020B0604020202020204" pitchFamily="34" charset="0"/>
-              <a:buChar char="•"/>
-            </a:pPr>
-            <a:r>
-              <a:rPr lang="en-GB" sz="1200" dirty="0"/>
-              <a:t>The threshold between adult/child will be 18 years.</a:t>
-            </a:r>
-          </a:p>
-          <a:p>
-            <a:pPr marL="285750" indent="-285750">
-              <a:buFont typeface="Arial" panose="020B0604020202020204" pitchFamily="34" charset="0"/>
-              <a:buChar char="•"/>
-            </a:pPr>
-            <a:r>
-              <a:rPr lang="en-GB" sz="1200" dirty="0"/>
-              <a:t>The dataset will be clean and complete.</a:t>
-            </a:r>
-          </a:p>
-          <a:p>
-            <a:pPr marL="285750" indent="-285750">
-              <a:buFont typeface="Arial" panose="020B0604020202020204" pitchFamily="34" charset="0"/>
-              <a:buChar char="•"/>
-            </a:pPr>
-            <a:r>
-              <a:rPr lang="en-GB" sz="1200" dirty="0"/>
-              <a:t>The eGFR values will be estimated by laboratory calculation (SCTID: 1107411000000104)</a:t>
-            </a:r>
-          </a:p>
-          <a:p>
             <a:endParaRPr lang="en-GB" dirty="0"/>
           </a:p>
         </p:txBody>
@@ -1179,7 +1133,7 @@
     </p:spTree>
     <p:extLst>
       <p:ext uri="{BB962C8B-B14F-4D97-AF65-F5344CB8AC3E}">
-        <p14:creationId xmlns:p14="http://schemas.microsoft.com/office/powerpoint/2010/main" val="1982900608"/>
+        <p14:creationId xmlns:p14="http://schemas.microsoft.com/office/powerpoint/2010/main" val="915333066"/>
       </p:ext>
     </p:extLst>
   </p:cSld>
@@ -1233,14 +1187,7 @@
           <a:bodyPr/>
           <a:lstStyle/>
           <a:p>
-            <a:pPr marL="0" indent="0">
-              <a:buFont typeface="Arial" panose="020B0604020202020204" pitchFamily="34" charset="0"/>
-              <a:buNone/>
-            </a:pPr>
-            <a:r>
-              <a:rPr lang="en-GB" dirty="0"/>
-              <a:t>Real world clinical data can be messy and incomplete in ways that are not easy to fix computationally. Addressing such problems at the data collection stage is challenging.</a:t>
-            </a:r>
+            <a:endParaRPr lang="en-GB" dirty="0"/>
           </a:p>
         </p:txBody>
       </p:sp>
@@ -1270,7 +1217,7 @@
     </p:spTree>
     <p:extLst>
       <p:ext uri="{BB962C8B-B14F-4D97-AF65-F5344CB8AC3E}">
-        <p14:creationId xmlns:p14="http://schemas.microsoft.com/office/powerpoint/2010/main" val="2187993841"/>
+        <p14:creationId xmlns:p14="http://schemas.microsoft.com/office/powerpoint/2010/main" val="1982900608"/>
       </p:ext>
     </p:extLst>
   </p:cSld>
@@ -1328,7 +1275,10 @@
               <a:buFont typeface="Arial" panose="020B0604020202020204" pitchFamily="34" charset="0"/>
               <a:buNone/>
             </a:pPr>
-            <a:endParaRPr lang="en-GB" dirty="0"/>
+            <a:r>
+              <a:rPr lang="en-GB" dirty="0"/>
+              <a:t>Real world clinical data can be messy and incomplete in ways that are not easy to fix computationally. Addressing such problems at the data collection stage is challenging.</a:t>
+            </a:r>
           </a:p>
         </p:txBody>
       </p:sp>
@@ -1358,7 +1308,179 @@
     </p:spTree>
     <p:extLst>
       <p:ext uri="{BB962C8B-B14F-4D97-AF65-F5344CB8AC3E}">
+        <p14:creationId xmlns:p14="http://schemas.microsoft.com/office/powerpoint/2010/main" val="2187993841"/>
+      </p:ext>
+    </p:extLst>
+  </p:cSld>
+  <p:clrMapOvr>
+    <a:masterClrMapping/>
+  </p:clrMapOvr>
+</p:notes>
+</file>
+
+<file path=ppt/notesSlides/notesSlide8.xml><?xml version="1.0" encoding="utf-8"?>
+<p:notes xmlns:a="http://schemas.openxmlformats.org/drawingml/2006/main" xmlns:r="http://schemas.openxmlformats.org/officeDocument/2006/relationships" xmlns:p="http://schemas.openxmlformats.org/presentationml/2006/main">
+  <p:cSld>
+    <p:spTree>
+      <p:nvGrpSpPr>
+        <p:cNvPr id="1" name=""/>
+        <p:cNvGrpSpPr/>
+        <p:nvPr/>
+      </p:nvGrpSpPr>
+      <p:grpSpPr>
+        <a:xfrm>
+          <a:off x="0" y="0"/>
+          <a:ext cx="0" cy="0"/>
+          <a:chOff x="0" y="0"/>
+          <a:chExt cx="0" cy="0"/>
+        </a:xfrm>
+      </p:grpSpPr>
+      <p:sp>
+        <p:nvSpPr>
+          <p:cNvPr id="2" name="Slide Image Placeholder 1"/>
+          <p:cNvSpPr>
+            <a:spLocks noGrp="1" noRot="1" noChangeAspect="1"/>
+          </p:cNvSpPr>
+          <p:nvPr>
+            <p:ph type="sldImg"/>
+          </p:nvPr>
+        </p:nvSpPr>
+        <p:spPr/>
+      </p:sp>
+      <p:sp>
+        <p:nvSpPr>
+          <p:cNvPr id="3" name="Notes Placeholder 2"/>
+          <p:cNvSpPr>
+            <a:spLocks noGrp="1"/>
+          </p:cNvSpPr>
+          <p:nvPr>
+            <p:ph type="body" idx="1"/>
+          </p:nvPr>
+        </p:nvSpPr>
+        <p:spPr/>
+        <p:txBody>
+          <a:bodyPr/>
+          <a:lstStyle/>
+          <a:p>
+            <a:pPr marL="0" indent="0">
+              <a:buFont typeface="Arial" panose="020B0604020202020204" pitchFamily="34" charset="0"/>
+              <a:buNone/>
+            </a:pPr>
+            <a:endParaRPr lang="en-GB" dirty="0"/>
+          </a:p>
+        </p:txBody>
+      </p:sp>
+      <p:sp>
+        <p:nvSpPr>
+          <p:cNvPr id="4" name="Slide Number Placeholder 3"/>
+          <p:cNvSpPr>
+            <a:spLocks noGrp="1"/>
+          </p:cNvSpPr>
+          <p:nvPr>
+            <p:ph type="sldNum" sz="quarter" idx="5"/>
+          </p:nvPr>
+        </p:nvSpPr>
+        <p:spPr/>
+        <p:txBody>
+          <a:bodyPr/>
+          <a:lstStyle/>
+          <a:p>
+            <a:fld id="{D43F5A87-3640-4250-99BF-EB29ABBC9BEB}" type="slidenum">
+              <a:rPr lang="en-GB" smtClean="0"/>
+              <a:t>8</a:t>
+            </a:fld>
+            <a:endParaRPr lang="en-GB"/>
+          </a:p>
+        </p:txBody>
+      </p:sp>
+    </p:spTree>
+    <p:extLst>
+      <p:ext uri="{BB962C8B-B14F-4D97-AF65-F5344CB8AC3E}">
         <p14:creationId xmlns:p14="http://schemas.microsoft.com/office/powerpoint/2010/main" val="2221408812"/>
+      </p:ext>
+    </p:extLst>
+  </p:cSld>
+  <p:clrMapOvr>
+    <a:masterClrMapping/>
+  </p:clrMapOvr>
+</p:notes>
+</file>
+
+<file path=ppt/notesSlides/notesSlide9.xml><?xml version="1.0" encoding="utf-8"?>
+<p:notes xmlns:a="http://schemas.openxmlformats.org/drawingml/2006/main" xmlns:r="http://schemas.openxmlformats.org/officeDocument/2006/relationships" xmlns:p="http://schemas.openxmlformats.org/presentationml/2006/main">
+  <p:cSld>
+    <p:spTree>
+      <p:nvGrpSpPr>
+        <p:cNvPr id="1" name=""/>
+        <p:cNvGrpSpPr/>
+        <p:nvPr/>
+      </p:nvGrpSpPr>
+      <p:grpSpPr>
+        <a:xfrm>
+          <a:off x="0" y="0"/>
+          <a:ext cx="0" cy="0"/>
+          <a:chOff x="0" y="0"/>
+          <a:chExt cx="0" cy="0"/>
+        </a:xfrm>
+      </p:grpSpPr>
+      <p:sp>
+        <p:nvSpPr>
+          <p:cNvPr id="2" name="Slide Image Placeholder 1"/>
+          <p:cNvSpPr>
+            <a:spLocks noGrp="1" noRot="1" noChangeAspect="1"/>
+          </p:cNvSpPr>
+          <p:nvPr>
+            <p:ph type="sldImg"/>
+          </p:nvPr>
+        </p:nvSpPr>
+        <p:spPr/>
+      </p:sp>
+      <p:sp>
+        <p:nvSpPr>
+          <p:cNvPr id="3" name="Notes Placeholder 2"/>
+          <p:cNvSpPr>
+            <a:spLocks noGrp="1"/>
+          </p:cNvSpPr>
+          <p:nvPr>
+            <p:ph type="body" idx="1"/>
+          </p:nvPr>
+        </p:nvSpPr>
+        <p:spPr/>
+        <p:txBody>
+          <a:bodyPr/>
+          <a:lstStyle/>
+          <a:p>
+            <a:endParaRPr lang="en-GB" dirty="0"/>
+          </a:p>
+        </p:txBody>
+      </p:sp>
+      <p:sp>
+        <p:nvSpPr>
+          <p:cNvPr id="4" name="Slide Number Placeholder 3"/>
+          <p:cNvSpPr>
+            <a:spLocks noGrp="1"/>
+          </p:cNvSpPr>
+          <p:nvPr>
+            <p:ph type="sldNum" sz="quarter" idx="5"/>
+          </p:nvPr>
+        </p:nvSpPr>
+        <p:spPr/>
+        <p:txBody>
+          <a:bodyPr/>
+          <a:lstStyle/>
+          <a:p>
+            <a:fld id="{D43F5A87-3640-4250-99BF-EB29ABBC9BEB}" type="slidenum">
+              <a:rPr lang="en-GB" smtClean="0"/>
+              <a:t>9</a:t>
+            </a:fld>
+            <a:endParaRPr lang="en-GB"/>
+          </a:p>
+        </p:txBody>
+      </p:sp>
+    </p:spTree>
+    <p:extLst>
+      <p:ext uri="{BB962C8B-B14F-4D97-AF65-F5344CB8AC3E}">
+        <p14:creationId xmlns:p14="http://schemas.microsoft.com/office/powerpoint/2010/main" val="630817288"/>
       </p:ext>
     </p:extLst>
   </p:cSld>
@@ -4781,889 +4903,7 @@
 </p:sld>
 </file>
 
-<file path=ppt/slides/slide2.xml><?xml version="1.0" encoding="utf-8"?>
-<p:sld xmlns:a="http://schemas.openxmlformats.org/drawingml/2006/main" xmlns:r="http://schemas.openxmlformats.org/officeDocument/2006/relationships" xmlns:p="http://schemas.openxmlformats.org/presentationml/2006/main">
-  <p:cSld>
-    <p:spTree>
-      <p:nvGrpSpPr>
-        <p:cNvPr id="1" name=""/>
-        <p:cNvGrpSpPr/>
-        <p:nvPr/>
-      </p:nvGrpSpPr>
-      <p:grpSpPr>
-        <a:xfrm>
-          <a:off x="0" y="0"/>
-          <a:ext cx="0" cy="0"/>
-          <a:chOff x="0" y="0"/>
-          <a:chExt cx="0" cy="0"/>
-        </a:xfrm>
-      </p:grpSpPr>
-      <p:sp>
-        <p:nvSpPr>
-          <p:cNvPr id="2" name="TextBox 1">
-            <a:extLst>
-              <a:ext uri="{FF2B5EF4-FFF2-40B4-BE49-F238E27FC236}">
-                <a16:creationId xmlns:a16="http://schemas.microsoft.com/office/drawing/2014/main" id="{EA99F039-9A9B-4C46-91C4-5F24DB6ABFCE}"/>
-              </a:ext>
-            </a:extLst>
-          </p:cNvPr>
-          <p:cNvSpPr txBox="1"/>
-          <p:nvPr/>
-        </p:nvSpPr>
-        <p:spPr>
-          <a:xfrm>
-            <a:off x="838199" y="291090"/>
-            <a:ext cx="10515599" cy="932688"/>
-          </a:xfrm>
-          <a:prstGeom prst="rect">
-            <a:avLst/>
-          </a:prstGeom>
-        </p:spPr>
-        <p:txBody>
-          <a:bodyPr vert="horz" lIns="91440" tIns="45720" rIns="91440" bIns="45720" rtlCol="0" anchor="b">
-            <a:normAutofit/>
-          </a:bodyPr>
-          <a:lstStyle/>
-          <a:p>
-            <a:pPr>
-              <a:lnSpc>
-                <a:spcPct val="90000"/>
-              </a:lnSpc>
-              <a:spcBef>
-                <a:spcPct val="0"/>
-              </a:spcBef>
-              <a:spcAft>
-                <a:spcPts val="600"/>
-              </a:spcAft>
-            </a:pPr>
-            <a:r>
-              <a:rPr lang="en-US" sz="5400" kern="1200" dirty="0">
-                <a:solidFill>
-                  <a:schemeClr val="tx1"/>
-                </a:solidFill>
-                <a:latin typeface="+mj-lt"/>
-                <a:ea typeface="+mj-ea"/>
-                <a:cs typeface="+mj-cs"/>
-              </a:rPr>
-              <a:t>Background</a:t>
-            </a:r>
-          </a:p>
-        </p:txBody>
-      </p:sp>
-      <p:sp>
-        <p:nvSpPr>
-          <p:cNvPr id="3" name="TextBox 2">
-            <a:extLst>
-              <a:ext uri="{FF2B5EF4-FFF2-40B4-BE49-F238E27FC236}">
-                <a16:creationId xmlns:a16="http://schemas.microsoft.com/office/drawing/2014/main" id="{C02D0B3F-B8AF-4BC5-ADAD-DC46CF9CD810}"/>
-              </a:ext>
-            </a:extLst>
-          </p:cNvPr>
-          <p:cNvSpPr txBox="1"/>
-          <p:nvPr/>
-        </p:nvSpPr>
-        <p:spPr>
-          <a:xfrm>
-            <a:off x="1066798" y="1780293"/>
-            <a:ext cx="10058400" cy="5016758"/>
-          </a:xfrm>
-          <a:prstGeom prst="rect">
-            <a:avLst/>
-          </a:prstGeom>
-          <a:noFill/>
-        </p:spPr>
-        <p:txBody>
-          <a:bodyPr wrap="square" rtlCol="0">
-            <a:spAutoFit/>
-          </a:bodyPr>
-          <a:lstStyle/>
-          <a:p>
-            <a:r>
-              <a:rPr lang="en-GB" sz="3200" b="1" dirty="0"/>
-              <a:t>Acute kidney injury (AKI)</a:t>
-            </a:r>
-          </a:p>
-          <a:p>
-            <a:pPr marL="457200" indent="-457200">
-              <a:buFont typeface="Arial" panose="020B0604020202020204" pitchFamily="34" charset="0"/>
-              <a:buChar char="•"/>
-            </a:pPr>
-            <a:r>
-              <a:rPr lang="en-GB" sz="3200" dirty="0"/>
-              <a:t>Common in critically ill patients; high mortality rate.</a:t>
-            </a:r>
-          </a:p>
-          <a:p>
-            <a:pPr marL="457200" indent="-457200">
-              <a:buFont typeface="Arial" panose="020B0604020202020204" pitchFamily="34" charset="0"/>
-              <a:buChar char="•"/>
-            </a:pPr>
-            <a:r>
-              <a:rPr lang="en-GB" sz="3200" dirty="0"/>
-              <a:t>Can develop during ECMO; used to treat severely ill patients with COVID-19</a:t>
-            </a:r>
-          </a:p>
-          <a:p>
-            <a:endParaRPr lang="en-GB" sz="3200" dirty="0"/>
-          </a:p>
-          <a:p>
-            <a:r>
-              <a:rPr lang="en-GB" sz="3200" b="1" dirty="0"/>
-              <a:t>Uses of CQL expression output</a:t>
-            </a:r>
-            <a:r>
-              <a:rPr lang="en-GB" sz="3200" dirty="0"/>
-              <a:t> </a:t>
-            </a:r>
-          </a:p>
-          <a:p>
-            <a:pPr marL="285750" indent="-285750">
-              <a:buFont typeface="Arial" panose="020B0604020202020204" pitchFamily="34" charset="0"/>
-              <a:buChar char="•"/>
-            </a:pPr>
-            <a:r>
-              <a:rPr lang="en-GB" sz="3200" dirty="0"/>
-              <a:t>Clinical: Flag at-risk patients for immediate intervention.</a:t>
-            </a:r>
-          </a:p>
-          <a:p>
-            <a:pPr marL="285750" indent="-285750">
-              <a:buFont typeface="Arial" panose="020B0604020202020204" pitchFamily="34" charset="0"/>
-              <a:buChar char="•"/>
-            </a:pPr>
-            <a:r>
-              <a:rPr lang="en-GB" sz="3200" dirty="0"/>
-              <a:t>Research: Investigate outcomes in patients identified as being at risk.</a:t>
-            </a:r>
-          </a:p>
-          <a:p>
-            <a:endParaRPr lang="en-GB" sz="3200" dirty="0"/>
-          </a:p>
-        </p:txBody>
-      </p:sp>
-    </p:spTree>
-    <p:extLst>
-      <p:ext uri="{BB962C8B-B14F-4D97-AF65-F5344CB8AC3E}">
-        <p14:creationId xmlns:p14="http://schemas.microsoft.com/office/powerpoint/2010/main" val="4029531985"/>
-      </p:ext>
-    </p:extLst>
-  </p:cSld>
-  <p:clrMapOvr>
-    <a:masterClrMapping/>
-  </p:clrMapOvr>
-</p:sld>
-</file>
-
-<file path=ppt/slides/slide3.xml><?xml version="1.0" encoding="utf-8"?>
-<p:sld xmlns:a="http://schemas.openxmlformats.org/drawingml/2006/main" xmlns:r="http://schemas.openxmlformats.org/officeDocument/2006/relationships" xmlns:p="http://schemas.openxmlformats.org/presentationml/2006/main">
-  <p:cSld>
-    <p:spTree>
-      <p:nvGrpSpPr>
-        <p:cNvPr id="1" name=""/>
-        <p:cNvGrpSpPr/>
-        <p:nvPr/>
-      </p:nvGrpSpPr>
-      <p:grpSpPr>
-        <a:xfrm>
-          <a:off x="0" y="0"/>
-          <a:ext cx="0" cy="0"/>
-          <a:chOff x="0" y="0"/>
-          <a:chExt cx="0" cy="0"/>
-        </a:xfrm>
-      </p:grpSpPr>
-      <p:sp>
-        <p:nvSpPr>
-          <p:cNvPr id="2" name="TextBox 1">
-            <a:extLst>
-              <a:ext uri="{FF2B5EF4-FFF2-40B4-BE49-F238E27FC236}">
-                <a16:creationId xmlns:a16="http://schemas.microsoft.com/office/drawing/2014/main" id="{EA99F039-9A9B-4C46-91C4-5F24DB6ABFCE}"/>
-              </a:ext>
-            </a:extLst>
-          </p:cNvPr>
-          <p:cNvSpPr txBox="1"/>
-          <p:nvPr/>
-        </p:nvSpPr>
-        <p:spPr>
-          <a:xfrm>
-            <a:off x="838199" y="291090"/>
-            <a:ext cx="10515599" cy="932688"/>
-          </a:xfrm>
-          <a:prstGeom prst="rect">
-            <a:avLst/>
-          </a:prstGeom>
-        </p:spPr>
-        <p:txBody>
-          <a:bodyPr vert="horz" lIns="91440" tIns="45720" rIns="91440" bIns="45720" rtlCol="0" anchor="b">
-            <a:normAutofit/>
-          </a:bodyPr>
-          <a:lstStyle/>
-          <a:p>
-            <a:pPr>
-              <a:lnSpc>
-                <a:spcPct val="90000"/>
-              </a:lnSpc>
-              <a:spcBef>
-                <a:spcPct val="0"/>
-              </a:spcBef>
-              <a:spcAft>
-                <a:spcPts val="600"/>
-              </a:spcAft>
-            </a:pPr>
-            <a:r>
-              <a:rPr lang="en-US" sz="5400" kern="1200" dirty="0">
-                <a:solidFill>
-                  <a:schemeClr val="tx1"/>
-                </a:solidFill>
-                <a:latin typeface="+mj-lt"/>
-                <a:ea typeface="+mj-ea"/>
-                <a:cs typeface="+mj-cs"/>
-              </a:rPr>
-              <a:t>Context and Generalizability</a:t>
-            </a:r>
-          </a:p>
-        </p:txBody>
-      </p:sp>
-      <p:sp>
-        <p:nvSpPr>
-          <p:cNvPr id="3" name="TextBox 2">
-            <a:extLst>
-              <a:ext uri="{FF2B5EF4-FFF2-40B4-BE49-F238E27FC236}">
-                <a16:creationId xmlns:a16="http://schemas.microsoft.com/office/drawing/2014/main" id="{C02D0B3F-B8AF-4BC5-ADAD-DC46CF9CD810}"/>
-              </a:ext>
-            </a:extLst>
-          </p:cNvPr>
-          <p:cNvSpPr txBox="1"/>
-          <p:nvPr/>
-        </p:nvSpPr>
-        <p:spPr>
-          <a:xfrm>
-            <a:off x="1066798" y="1780293"/>
-            <a:ext cx="10058400" cy="3539430"/>
-          </a:xfrm>
-          <a:prstGeom prst="rect">
-            <a:avLst/>
-          </a:prstGeom>
-          <a:noFill/>
-        </p:spPr>
-        <p:txBody>
-          <a:bodyPr wrap="square" rtlCol="0">
-            <a:spAutoFit/>
-          </a:bodyPr>
-          <a:lstStyle/>
-          <a:p>
-            <a:r>
-              <a:rPr lang="en-GB" sz="3200" b="1" dirty="0"/>
-              <a:t>The narrative NICE guidelines are open to interpretation</a:t>
-            </a:r>
-          </a:p>
-          <a:p>
-            <a:pPr marL="457200" indent="-457200">
-              <a:buFont typeface="Arial" panose="020B0604020202020204" pitchFamily="34" charset="0"/>
-              <a:buChar char="•"/>
-            </a:pPr>
-            <a:r>
-              <a:rPr lang="en-GB" sz="3200" dirty="0"/>
-              <a:t>They do not define assumptions regarding source data, thresholds, specific estimates used etc.</a:t>
-            </a:r>
-          </a:p>
-          <a:p>
-            <a:r>
-              <a:rPr lang="en-GB" sz="3200" b="1" dirty="0"/>
-              <a:t>Some SNOMED-CT codes are open to interpretation</a:t>
-            </a:r>
-          </a:p>
-          <a:p>
-            <a:pPr marL="457200" indent="-457200">
-              <a:buFont typeface="Arial" panose="020B0604020202020204" pitchFamily="34" charset="0"/>
-              <a:buChar char="•"/>
-            </a:pPr>
-            <a:r>
-              <a:rPr lang="en-GB" sz="3200" dirty="0"/>
-              <a:t>e.g. Codes for AKI risk and warning are not tied to a specific risk criteria.</a:t>
-            </a:r>
-          </a:p>
-          <a:p>
-            <a:endParaRPr lang="en-GB" sz="3200" dirty="0"/>
-          </a:p>
-        </p:txBody>
-      </p:sp>
-    </p:spTree>
-    <p:extLst>
-      <p:ext uri="{BB962C8B-B14F-4D97-AF65-F5344CB8AC3E}">
-        <p14:creationId xmlns:p14="http://schemas.microsoft.com/office/powerpoint/2010/main" val="2572149625"/>
-      </p:ext>
-    </p:extLst>
-  </p:cSld>
-  <p:clrMapOvr>
-    <a:masterClrMapping/>
-  </p:clrMapOvr>
-</p:sld>
-</file>
-
-<file path=ppt/slides/slide4.xml><?xml version="1.0" encoding="utf-8"?>
-<p:sld xmlns:a="http://schemas.openxmlformats.org/drawingml/2006/main" xmlns:r="http://schemas.openxmlformats.org/officeDocument/2006/relationships" xmlns:p="http://schemas.openxmlformats.org/presentationml/2006/main">
-  <p:cSld>
-    <p:spTree>
-      <p:nvGrpSpPr>
-        <p:cNvPr id="1" name=""/>
-        <p:cNvGrpSpPr/>
-        <p:nvPr/>
-      </p:nvGrpSpPr>
-      <p:grpSpPr>
-        <a:xfrm>
-          <a:off x="0" y="0"/>
-          <a:ext cx="0" cy="0"/>
-          <a:chOff x="0" y="0"/>
-          <a:chExt cx="0" cy="0"/>
-        </a:xfrm>
-      </p:grpSpPr>
-      <p:sp>
-        <p:nvSpPr>
-          <p:cNvPr id="4" name="TextBox 3">
-            <a:extLst>
-              <a:ext uri="{FF2B5EF4-FFF2-40B4-BE49-F238E27FC236}">
-                <a16:creationId xmlns:a16="http://schemas.microsoft.com/office/drawing/2014/main" id="{7E5BDBA5-B888-4FFF-BC67-C89AB9DB313A}"/>
-              </a:ext>
-            </a:extLst>
-          </p:cNvPr>
-          <p:cNvSpPr txBox="1"/>
-          <p:nvPr/>
-        </p:nvSpPr>
-        <p:spPr>
-          <a:xfrm>
-            <a:off x="838199" y="291090"/>
-            <a:ext cx="10515599" cy="932688"/>
-          </a:xfrm>
-          <a:prstGeom prst="rect">
-            <a:avLst/>
-          </a:prstGeom>
-        </p:spPr>
-        <p:txBody>
-          <a:bodyPr vert="horz" lIns="91440" tIns="45720" rIns="91440" bIns="45720" rtlCol="0" anchor="b">
-            <a:normAutofit/>
-          </a:bodyPr>
-          <a:lstStyle/>
-          <a:p>
-            <a:pPr>
-              <a:lnSpc>
-                <a:spcPct val="90000"/>
-              </a:lnSpc>
-              <a:spcBef>
-                <a:spcPct val="0"/>
-              </a:spcBef>
-              <a:spcAft>
-                <a:spcPts val="600"/>
-              </a:spcAft>
-            </a:pPr>
-            <a:r>
-              <a:rPr lang="en-US" sz="5400" dirty="0">
-                <a:latin typeface="+mj-lt"/>
-                <a:ea typeface="+mj-ea"/>
-                <a:cs typeface="+mj-cs"/>
-              </a:rPr>
-              <a:t>Our Assumptions</a:t>
-            </a:r>
-            <a:endParaRPr lang="en-US" sz="5400" kern="1200" dirty="0">
-              <a:solidFill>
-                <a:schemeClr val="tx1"/>
-              </a:solidFill>
-              <a:latin typeface="+mj-lt"/>
-              <a:ea typeface="+mj-ea"/>
-              <a:cs typeface="+mj-cs"/>
-            </a:endParaRPr>
-          </a:p>
-        </p:txBody>
-      </p:sp>
-      <p:sp>
-        <p:nvSpPr>
-          <p:cNvPr id="16" name="TextBox 15">
-            <a:extLst>
-              <a:ext uri="{FF2B5EF4-FFF2-40B4-BE49-F238E27FC236}">
-                <a16:creationId xmlns:a16="http://schemas.microsoft.com/office/drawing/2014/main" id="{34DFDE29-02C6-46BD-B018-7A1DF26D7E5D}"/>
-              </a:ext>
-            </a:extLst>
-          </p:cNvPr>
-          <p:cNvSpPr txBox="1"/>
-          <p:nvPr/>
-        </p:nvSpPr>
-        <p:spPr>
-          <a:xfrm>
-            <a:off x="1018903" y="1762005"/>
-            <a:ext cx="10058400" cy="3046988"/>
-          </a:xfrm>
-          <a:prstGeom prst="rect">
-            <a:avLst/>
-          </a:prstGeom>
-          <a:noFill/>
-        </p:spPr>
-        <p:txBody>
-          <a:bodyPr wrap="square" rtlCol="0">
-            <a:spAutoFit/>
-          </a:bodyPr>
-          <a:lstStyle/>
-          <a:p>
-            <a:pPr marL="285750" indent="-285750">
-              <a:buFont typeface="Arial" panose="020B0604020202020204" pitchFamily="34" charset="0"/>
-              <a:buChar char="•"/>
-            </a:pPr>
-            <a:r>
-              <a:rPr lang="en-GB" sz="3200" dirty="0"/>
-              <a:t>The dataset will be clean and complete (!)</a:t>
-            </a:r>
-          </a:p>
-          <a:p>
-            <a:pPr marL="285750" indent="-285750">
-              <a:buFont typeface="Arial" panose="020B0604020202020204" pitchFamily="34" charset="0"/>
-              <a:buChar char="•"/>
-            </a:pPr>
-            <a:r>
-              <a:rPr lang="en-GB" sz="3200" dirty="0"/>
-              <a:t>The dataset will include one creatinine reading per patient per calendar day.</a:t>
-            </a:r>
-          </a:p>
-          <a:p>
-            <a:pPr marL="285750" indent="-285750">
-              <a:buFont typeface="Arial" panose="020B0604020202020204" pitchFamily="34" charset="0"/>
-              <a:buChar char="•"/>
-            </a:pPr>
-            <a:r>
-              <a:rPr lang="en-GB" sz="3200" dirty="0"/>
-              <a:t>The threshold between adult/child will be 18 years.</a:t>
-            </a:r>
-          </a:p>
-          <a:p>
-            <a:pPr marL="285750" indent="-285750">
-              <a:buFont typeface="Arial" panose="020B0604020202020204" pitchFamily="34" charset="0"/>
-              <a:buChar char="•"/>
-            </a:pPr>
-            <a:r>
-              <a:rPr lang="en-GB" sz="3200" dirty="0"/>
-              <a:t>The eGFR values will be estimated by laboratory calculation (SCTID: 1107411000000104).</a:t>
-            </a:r>
-          </a:p>
-        </p:txBody>
-      </p:sp>
-    </p:spTree>
-    <p:extLst>
-      <p:ext uri="{BB962C8B-B14F-4D97-AF65-F5344CB8AC3E}">
-        <p14:creationId xmlns:p14="http://schemas.microsoft.com/office/powerpoint/2010/main" val="3412182844"/>
-      </p:ext>
-    </p:extLst>
-  </p:cSld>
-  <p:clrMapOvr>
-    <a:masterClrMapping/>
-  </p:clrMapOvr>
-</p:sld>
-</file>
-
-<file path=ppt/slides/slide5.xml><?xml version="1.0" encoding="utf-8"?>
-<p:sld xmlns:a="http://schemas.openxmlformats.org/drawingml/2006/main" xmlns:r="http://schemas.openxmlformats.org/officeDocument/2006/relationships" xmlns:p="http://schemas.openxmlformats.org/presentationml/2006/main">
-  <p:cSld>
-    <p:spTree>
-      <p:nvGrpSpPr>
-        <p:cNvPr id="1" name=""/>
-        <p:cNvGrpSpPr/>
-        <p:nvPr/>
-      </p:nvGrpSpPr>
-      <p:grpSpPr>
-        <a:xfrm>
-          <a:off x="0" y="0"/>
-          <a:ext cx="0" cy="0"/>
-          <a:chOff x="0" y="0"/>
-          <a:chExt cx="0" cy="0"/>
-        </a:xfrm>
-      </p:grpSpPr>
-      <p:sp>
-        <p:nvSpPr>
-          <p:cNvPr id="4" name="TextBox 3">
-            <a:extLst>
-              <a:ext uri="{FF2B5EF4-FFF2-40B4-BE49-F238E27FC236}">
-                <a16:creationId xmlns:a16="http://schemas.microsoft.com/office/drawing/2014/main" id="{7E5BDBA5-B888-4FFF-BC67-C89AB9DB313A}"/>
-              </a:ext>
-            </a:extLst>
-          </p:cNvPr>
-          <p:cNvSpPr txBox="1"/>
-          <p:nvPr/>
-        </p:nvSpPr>
-        <p:spPr>
-          <a:xfrm>
-            <a:off x="838199" y="291090"/>
-            <a:ext cx="10515599" cy="932688"/>
-          </a:xfrm>
-          <a:prstGeom prst="rect">
-            <a:avLst/>
-          </a:prstGeom>
-        </p:spPr>
-        <p:txBody>
-          <a:bodyPr vert="horz" lIns="91440" tIns="45720" rIns="91440" bIns="45720" rtlCol="0" anchor="b">
-            <a:normAutofit/>
-          </a:bodyPr>
-          <a:lstStyle/>
-          <a:p>
-            <a:pPr>
-              <a:lnSpc>
-                <a:spcPct val="90000"/>
-              </a:lnSpc>
-              <a:spcBef>
-                <a:spcPct val="0"/>
-              </a:spcBef>
-              <a:spcAft>
-                <a:spcPts val="600"/>
-              </a:spcAft>
-            </a:pPr>
-            <a:r>
-              <a:rPr lang="en-US" sz="5400" dirty="0">
-                <a:latin typeface="+mj-lt"/>
-                <a:ea typeface="+mj-ea"/>
-                <a:cs typeface="+mj-cs"/>
-              </a:rPr>
-              <a:t>CQL Challenges</a:t>
-            </a:r>
-            <a:endParaRPr lang="en-US" sz="5400" kern="1200" dirty="0">
-              <a:solidFill>
-                <a:schemeClr val="tx1"/>
-              </a:solidFill>
-              <a:latin typeface="+mj-lt"/>
-              <a:ea typeface="+mj-ea"/>
-              <a:cs typeface="+mj-cs"/>
-            </a:endParaRPr>
-          </a:p>
-        </p:txBody>
-      </p:sp>
-      <p:sp>
-        <p:nvSpPr>
-          <p:cNvPr id="16" name="TextBox 15">
-            <a:extLst>
-              <a:ext uri="{FF2B5EF4-FFF2-40B4-BE49-F238E27FC236}">
-                <a16:creationId xmlns:a16="http://schemas.microsoft.com/office/drawing/2014/main" id="{34DFDE29-02C6-46BD-B018-7A1DF26D7E5D}"/>
-              </a:ext>
-            </a:extLst>
-          </p:cNvPr>
-          <p:cNvSpPr txBox="1"/>
-          <p:nvPr/>
-        </p:nvSpPr>
-        <p:spPr>
-          <a:xfrm>
-            <a:off x="1018903" y="1762005"/>
-            <a:ext cx="10058400" cy="1077218"/>
-          </a:xfrm>
-          <a:prstGeom prst="rect">
-            <a:avLst/>
-          </a:prstGeom>
-          <a:noFill/>
-        </p:spPr>
-        <p:txBody>
-          <a:bodyPr wrap="square" rtlCol="0">
-            <a:spAutoFit/>
-          </a:bodyPr>
-          <a:lstStyle/>
-          <a:p>
-            <a:pPr marL="285750" indent="-285750">
-              <a:buFont typeface="Arial" panose="020B0604020202020204" pitchFamily="34" charset="0"/>
-              <a:buChar char="•"/>
-            </a:pPr>
-            <a:r>
-              <a:rPr lang="en-GB" sz="3200" dirty="0"/>
-              <a:t>Comparing values across time intervals</a:t>
-            </a:r>
-          </a:p>
-          <a:p>
-            <a:endParaRPr lang="en-GB" sz="3200" dirty="0"/>
-          </a:p>
-        </p:txBody>
-      </p:sp>
-    </p:spTree>
-    <p:extLst>
-      <p:ext uri="{BB962C8B-B14F-4D97-AF65-F5344CB8AC3E}">
-        <p14:creationId xmlns:p14="http://schemas.microsoft.com/office/powerpoint/2010/main" val="4120229691"/>
-      </p:ext>
-    </p:extLst>
-  </p:cSld>
-  <p:clrMapOvr>
-    <a:masterClrMapping/>
-  </p:clrMapOvr>
-</p:sld>
-</file>
-
-<file path=ppt/slides/slide6.xml><?xml version="1.0" encoding="utf-8"?>
-<p:sld xmlns:a="http://schemas.openxmlformats.org/drawingml/2006/main" xmlns:r="http://schemas.openxmlformats.org/officeDocument/2006/relationships" xmlns:p="http://schemas.openxmlformats.org/presentationml/2006/main">
-  <p:cSld>
-    <p:spTree>
-      <p:nvGrpSpPr>
-        <p:cNvPr id="1" name=""/>
-        <p:cNvGrpSpPr/>
-        <p:nvPr/>
-      </p:nvGrpSpPr>
-      <p:grpSpPr>
-        <a:xfrm>
-          <a:off x="0" y="0"/>
-          <a:ext cx="0" cy="0"/>
-          <a:chOff x="0" y="0"/>
-          <a:chExt cx="0" cy="0"/>
-        </a:xfrm>
-      </p:grpSpPr>
-      <p:sp>
-        <p:nvSpPr>
-          <p:cNvPr id="2" name="TextBox 1">
-            <a:extLst>
-              <a:ext uri="{FF2B5EF4-FFF2-40B4-BE49-F238E27FC236}">
-                <a16:creationId xmlns:a16="http://schemas.microsoft.com/office/drawing/2014/main" id="{EA99F039-9A9B-4C46-91C4-5F24DB6ABFCE}"/>
-              </a:ext>
-            </a:extLst>
-          </p:cNvPr>
-          <p:cNvSpPr txBox="1"/>
-          <p:nvPr/>
-        </p:nvSpPr>
-        <p:spPr>
-          <a:xfrm>
-            <a:off x="838199" y="291090"/>
-            <a:ext cx="10515599" cy="932688"/>
-          </a:xfrm>
-          <a:prstGeom prst="rect">
-            <a:avLst/>
-          </a:prstGeom>
-        </p:spPr>
-        <p:txBody>
-          <a:bodyPr vert="horz" lIns="91440" tIns="45720" rIns="91440" bIns="45720" rtlCol="0" anchor="b">
-            <a:normAutofit/>
-          </a:bodyPr>
-          <a:lstStyle/>
-          <a:p>
-            <a:pPr>
-              <a:lnSpc>
-                <a:spcPct val="90000"/>
-              </a:lnSpc>
-              <a:spcBef>
-                <a:spcPct val="0"/>
-              </a:spcBef>
-              <a:spcAft>
-                <a:spcPts val="600"/>
-              </a:spcAft>
-            </a:pPr>
-            <a:r>
-              <a:rPr lang="en-US" sz="5400" kern="1200" dirty="0">
-                <a:solidFill>
-                  <a:schemeClr val="tx1"/>
-                </a:solidFill>
-                <a:latin typeface="+mj-lt"/>
-                <a:ea typeface="+mj-ea"/>
-                <a:cs typeface="+mj-cs"/>
-              </a:rPr>
-              <a:t>Data Challenges</a:t>
-            </a:r>
-          </a:p>
-        </p:txBody>
-      </p:sp>
-      <p:sp>
-        <p:nvSpPr>
-          <p:cNvPr id="3" name="TextBox 2">
-            <a:extLst>
-              <a:ext uri="{FF2B5EF4-FFF2-40B4-BE49-F238E27FC236}">
-                <a16:creationId xmlns:a16="http://schemas.microsoft.com/office/drawing/2014/main" id="{C02D0B3F-B8AF-4BC5-ADAD-DC46CF9CD810}"/>
-              </a:ext>
-            </a:extLst>
-          </p:cNvPr>
-          <p:cNvSpPr txBox="1"/>
-          <p:nvPr/>
-        </p:nvSpPr>
-        <p:spPr>
-          <a:xfrm>
-            <a:off x="1066798" y="1780293"/>
-            <a:ext cx="10058400" cy="2062103"/>
-          </a:xfrm>
-          <a:prstGeom prst="rect">
-            <a:avLst/>
-          </a:prstGeom>
-          <a:noFill/>
-        </p:spPr>
-        <p:txBody>
-          <a:bodyPr wrap="square" rtlCol="0">
-            <a:spAutoFit/>
-          </a:bodyPr>
-          <a:lstStyle/>
-          <a:p>
-            <a:r>
-              <a:rPr lang="en-GB" sz="3200" b="1" dirty="0"/>
-              <a:t>Real world patient data can be messy and incomplete…</a:t>
-            </a:r>
-          </a:p>
-          <a:p>
-            <a:pPr marL="742950" lvl="1" indent="-285750">
-              <a:buFont typeface="Arial" panose="020B0604020202020204" pitchFamily="34" charset="0"/>
-              <a:buChar char="•"/>
-            </a:pPr>
-            <a:r>
-              <a:rPr lang="en-GB" sz="3200" dirty="0"/>
-              <a:t>Lab results (e.g. creatinine) are not always accurately timestamped.</a:t>
-            </a:r>
-          </a:p>
-          <a:p>
-            <a:pPr marL="742950" lvl="1" indent="-285750">
-              <a:buFont typeface="Arial" panose="020B0604020202020204" pitchFamily="34" charset="0"/>
-              <a:buChar char="•"/>
-            </a:pPr>
-            <a:r>
-              <a:rPr lang="en-GB" sz="3200" dirty="0"/>
-              <a:t>Creatinine assays may vary between labs.</a:t>
-            </a:r>
-          </a:p>
-        </p:txBody>
-      </p:sp>
-    </p:spTree>
-    <p:extLst>
-      <p:ext uri="{BB962C8B-B14F-4D97-AF65-F5344CB8AC3E}">
-        <p14:creationId xmlns:p14="http://schemas.microsoft.com/office/powerpoint/2010/main" val="1308647719"/>
-      </p:ext>
-    </p:extLst>
-  </p:cSld>
-  <p:clrMapOvr>
-    <a:masterClrMapping/>
-  </p:clrMapOvr>
-</p:sld>
-</file>
-
-<file path=ppt/slides/slide7.xml><?xml version="1.0" encoding="utf-8"?>
-<p:sld xmlns:a="http://schemas.openxmlformats.org/drawingml/2006/main" xmlns:r="http://schemas.openxmlformats.org/officeDocument/2006/relationships" xmlns:p="http://schemas.openxmlformats.org/presentationml/2006/main">
-  <p:cSld>
-    <p:spTree>
-      <p:nvGrpSpPr>
-        <p:cNvPr id="1" name=""/>
-        <p:cNvGrpSpPr/>
-        <p:nvPr/>
-      </p:nvGrpSpPr>
-      <p:grpSpPr>
-        <a:xfrm>
-          <a:off x="0" y="0"/>
-          <a:ext cx="0" cy="0"/>
-          <a:chOff x="0" y="0"/>
-          <a:chExt cx="0" cy="0"/>
-        </a:xfrm>
-      </p:grpSpPr>
-      <p:sp>
-        <p:nvSpPr>
-          <p:cNvPr id="2" name="TextBox 1">
-            <a:extLst>
-              <a:ext uri="{FF2B5EF4-FFF2-40B4-BE49-F238E27FC236}">
-                <a16:creationId xmlns:a16="http://schemas.microsoft.com/office/drawing/2014/main" id="{EA99F039-9A9B-4C46-91C4-5F24DB6ABFCE}"/>
-              </a:ext>
-            </a:extLst>
-          </p:cNvPr>
-          <p:cNvSpPr txBox="1"/>
-          <p:nvPr/>
-        </p:nvSpPr>
-        <p:spPr>
-          <a:xfrm>
-            <a:off x="838199" y="291090"/>
-            <a:ext cx="10515599" cy="932688"/>
-          </a:xfrm>
-          <a:prstGeom prst="rect">
-            <a:avLst/>
-          </a:prstGeom>
-        </p:spPr>
-        <p:txBody>
-          <a:bodyPr vert="horz" lIns="91440" tIns="45720" rIns="91440" bIns="45720" rtlCol="0" anchor="b">
-            <a:normAutofit/>
-          </a:bodyPr>
-          <a:lstStyle/>
-          <a:p>
-            <a:pPr>
-              <a:lnSpc>
-                <a:spcPct val="90000"/>
-              </a:lnSpc>
-              <a:spcBef>
-                <a:spcPct val="0"/>
-              </a:spcBef>
-              <a:spcAft>
-                <a:spcPts val="600"/>
-              </a:spcAft>
-            </a:pPr>
-            <a:r>
-              <a:rPr lang="en-US" sz="5400" dirty="0">
-                <a:latin typeface="+mj-lt"/>
-                <a:ea typeface="+mj-ea"/>
-                <a:cs typeface="+mj-cs"/>
-              </a:rPr>
-              <a:t>Summary</a:t>
-            </a:r>
-            <a:endParaRPr lang="en-US" sz="5400" kern="1200" dirty="0">
-              <a:solidFill>
-                <a:schemeClr val="tx1"/>
-              </a:solidFill>
-              <a:latin typeface="+mj-lt"/>
-              <a:ea typeface="+mj-ea"/>
-              <a:cs typeface="+mj-cs"/>
-            </a:endParaRPr>
-          </a:p>
-        </p:txBody>
-      </p:sp>
-      <p:sp>
-        <p:nvSpPr>
-          <p:cNvPr id="3" name="TextBox 2">
-            <a:extLst>
-              <a:ext uri="{FF2B5EF4-FFF2-40B4-BE49-F238E27FC236}">
-                <a16:creationId xmlns:a16="http://schemas.microsoft.com/office/drawing/2014/main" id="{C02D0B3F-B8AF-4BC5-ADAD-DC46CF9CD810}"/>
-              </a:ext>
-            </a:extLst>
-          </p:cNvPr>
-          <p:cNvSpPr txBox="1"/>
-          <p:nvPr/>
-        </p:nvSpPr>
-        <p:spPr>
-          <a:xfrm>
-            <a:off x="1066798" y="1780293"/>
-            <a:ext cx="10058400" cy="3046988"/>
-          </a:xfrm>
-          <a:prstGeom prst="rect">
-            <a:avLst/>
-          </a:prstGeom>
-          <a:noFill/>
-        </p:spPr>
-        <p:txBody>
-          <a:bodyPr wrap="square" rtlCol="0">
-            <a:spAutoFit/>
-          </a:bodyPr>
-          <a:lstStyle/>
-          <a:p>
-            <a:r>
-              <a:rPr lang="en-GB" sz="3200" b="1" dirty="0"/>
-              <a:t>CQL expressions have the potential to improve patient care when integrated into patient management systems.</a:t>
-            </a:r>
-          </a:p>
-          <a:p>
-            <a:endParaRPr lang="en-GB" sz="3200" b="1" dirty="0"/>
-          </a:p>
-          <a:p>
-            <a:r>
-              <a:rPr lang="en-GB" sz="3200" b="1" dirty="0"/>
-              <a:t>Many of the barriers to this are not technical:</a:t>
-            </a:r>
-          </a:p>
-          <a:p>
-            <a:pPr marL="457200" indent="-457200">
-              <a:buFont typeface="Arial" panose="020B0604020202020204" pitchFamily="34" charset="0"/>
-              <a:buChar char="•"/>
-            </a:pPr>
-            <a:r>
-              <a:rPr lang="en-GB" sz="3200" dirty="0"/>
-              <a:t>Clinicians and support staff need to adopt working practices that result in robust datasets.</a:t>
-            </a:r>
-          </a:p>
-        </p:txBody>
-      </p:sp>
-    </p:spTree>
-    <p:extLst>
-      <p:ext uri="{BB962C8B-B14F-4D97-AF65-F5344CB8AC3E}">
-        <p14:creationId xmlns:p14="http://schemas.microsoft.com/office/powerpoint/2010/main" val="197753112"/>
-      </p:ext>
-    </p:extLst>
-  </p:cSld>
-  <p:clrMapOvr>
-    <a:masterClrMapping/>
-  </p:clrMapOvr>
-</p:sld>
-</file>
-
-<file path=ppt/slides/slide8.xml><?xml version="1.0" encoding="utf-8"?>
+<file path=ppt/slides/slide10.xml><?xml version="1.0" encoding="utf-8"?>
 <p:sld xmlns:a="http://schemas.openxmlformats.org/drawingml/2006/main" xmlns:r="http://schemas.openxmlformats.org/officeDocument/2006/relationships" xmlns:p="http://schemas.openxmlformats.org/presentationml/2006/main">
   <p:cSld>
     <p:bg>
@@ -6112,6 +5352,1061 @@
     <p:extLst>
       <p:ext uri="{BB962C8B-B14F-4D97-AF65-F5344CB8AC3E}">
         <p14:creationId xmlns:p14="http://schemas.microsoft.com/office/powerpoint/2010/main" val="764136255"/>
+      </p:ext>
+    </p:extLst>
+  </p:cSld>
+  <p:clrMapOvr>
+    <a:masterClrMapping/>
+  </p:clrMapOvr>
+</p:sld>
+</file>
+
+<file path=ppt/slides/slide2.xml><?xml version="1.0" encoding="utf-8"?>
+<p:sld xmlns:a="http://schemas.openxmlformats.org/drawingml/2006/main" xmlns:r="http://schemas.openxmlformats.org/officeDocument/2006/relationships" xmlns:p="http://schemas.openxmlformats.org/presentationml/2006/main">
+  <p:cSld>
+    <p:spTree>
+      <p:nvGrpSpPr>
+        <p:cNvPr id="1" name=""/>
+        <p:cNvGrpSpPr/>
+        <p:nvPr/>
+      </p:nvGrpSpPr>
+      <p:grpSpPr>
+        <a:xfrm>
+          <a:off x="0" y="0"/>
+          <a:ext cx="0" cy="0"/>
+          <a:chOff x="0" y="0"/>
+          <a:chExt cx="0" cy="0"/>
+        </a:xfrm>
+      </p:grpSpPr>
+      <p:sp>
+        <p:nvSpPr>
+          <p:cNvPr id="2" name="TextBox 1">
+            <a:extLst>
+              <a:ext uri="{FF2B5EF4-FFF2-40B4-BE49-F238E27FC236}">
+                <a16:creationId xmlns:a16="http://schemas.microsoft.com/office/drawing/2014/main" id="{EA99F039-9A9B-4C46-91C4-5F24DB6ABFCE}"/>
+              </a:ext>
+            </a:extLst>
+          </p:cNvPr>
+          <p:cNvSpPr txBox="1"/>
+          <p:nvPr/>
+        </p:nvSpPr>
+        <p:spPr>
+          <a:xfrm>
+            <a:off x="838199" y="291090"/>
+            <a:ext cx="10515599" cy="932688"/>
+          </a:xfrm>
+          <a:prstGeom prst="rect">
+            <a:avLst/>
+          </a:prstGeom>
+        </p:spPr>
+        <p:txBody>
+          <a:bodyPr vert="horz" lIns="91440" tIns="45720" rIns="91440" bIns="45720" rtlCol="0" anchor="b">
+            <a:normAutofit/>
+          </a:bodyPr>
+          <a:lstStyle/>
+          <a:p>
+            <a:pPr>
+              <a:lnSpc>
+                <a:spcPct val="90000"/>
+              </a:lnSpc>
+              <a:spcBef>
+                <a:spcPct val="0"/>
+              </a:spcBef>
+              <a:spcAft>
+                <a:spcPts val="600"/>
+              </a:spcAft>
+            </a:pPr>
+            <a:r>
+              <a:rPr lang="en-US" sz="5400" kern="1200" dirty="0">
+                <a:solidFill>
+                  <a:schemeClr val="tx1"/>
+                </a:solidFill>
+                <a:latin typeface="+mj-lt"/>
+                <a:ea typeface="+mj-ea"/>
+                <a:cs typeface="+mj-cs"/>
+              </a:rPr>
+              <a:t>Background</a:t>
+            </a:r>
+          </a:p>
+        </p:txBody>
+      </p:sp>
+      <p:sp>
+        <p:nvSpPr>
+          <p:cNvPr id="3" name="TextBox 2">
+            <a:extLst>
+              <a:ext uri="{FF2B5EF4-FFF2-40B4-BE49-F238E27FC236}">
+                <a16:creationId xmlns:a16="http://schemas.microsoft.com/office/drawing/2014/main" id="{C02D0B3F-B8AF-4BC5-ADAD-DC46CF9CD810}"/>
+              </a:ext>
+            </a:extLst>
+          </p:cNvPr>
+          <p:cNvSpPr txBox="1"/>
+          <p:nvPr/>
+        </p:nvSpPr>
+        <p:spPr>
+          <a:xfrm>
+            <a:off x="1066798" y="1780293"/>
+            <a:ext cx="10058400" cy="5016758"/>
+          </a:xfrm>
+          <a:prstGeom prst="rect">
+            <a:avLst/>
+          </a:prstGeom>
+          <a:noFill/>
+        </p:spPr>
+        <p:txBody>
+          <a:bodyPr wrap="square" rtlCol="0">
+            <a:spAutoFit/>
+          </a:bodyPr>
+          <a:lstStyle/>
+          <a:p>
+            <a:r>
+              <a:rPr lang="en-GB" sz="3200" b="1" dirty="0"/>
+              <a:t>Acute kidney injury (AKI)</a:t>
+            </a:r>
+          </a:p>
+          <a:p>
+            <a:pPr marL="457200" indent="-457200">
+              <a:buFont typeface="Arial" panose="020B0604020202020204" pitchFamily="34" charset="0"/>
+              <a:buChar char="•"/>
+            </a:pPr>
+            <a:r>
+              <a:rPr lang="en-GB" sz="3200" dirty="0"/>
+              <a:t>Common in critically ill patients; high mortality rate.</a:t>
+            </a:r>
+          </a:p>
+          <a:p>
+            <a:pPr marL="457200" indent="-457200">
+              <a:buFont typeface="Arial" panose="020B0604020202020204" pitchFamily="34" charset="0"/>
+              <a:buChar char="•"/>
+            </a:pPr>
+            <a:r>
+              <a:rPr lang="en-GB" sz="3200" dirty="0"/>
+              <a:t>Can develop during ECMO; used to treat severely ill patients with COVID-19</a:t>
+            </a:r>
+          </a:p>
+          <a:p>
+            <a:endParaRPr lang="en-GB" sz="3200" dirty="0"/>
+          </a:p>
+          <a:p>
+            <a:r>
+              <a:rPr lang="en-GB" sz="3200" b="1" dirty="0"/>
+              <a:t>Uses of CQL expression output</a:t>
+            </a:r>
+            <a:r>
+              <a:rPr lang="en-GB" sz="3200" dirty="0"/>
+              <a:t> </a:t>
+            </a:r>
+          </a:p>
+          <a:p>
+            <a:pPr marL="285750" indent="-285750">
+              <a:buFont typeface="Arial" panose="020B0604020202020204" pitchFamily="34" charset="0"/>
+              <a:buChar char="•"/>
+            </a:pPr>
+            <a:r>
+              <a:rPr lang="en-GB" sz="3200" dirty="0"/>
+              <a:t>Clinical: Flag at-risk patients for immediate intervention.</a:t>
+            </a:r>
+          </a:p>
+          <a:p>
+            <a:pPr marL="285750" indent="-285750">
+              <a:buFont typeface="Arial" panose="020B0604020202020204" pitchFamily="34" charset="0"/>
+              <a:buChar char="•"/>
+            </a:pPr>
+            <a:r>
+              <a:rPr lang="en-GB" sz="3200" dirty="0"/>
+              <a:t>Research: Investigate outcomes in patients identified as being at risk.</a:t>
+            </a:r>
+          </a:p>
+          <a:p>
+            <a:endParaRPr lang="en-GB" sz="3200" dirty="0"/>
+          </a:p>
+        </p:txBody>
+      </p:sp>
+    </p:spTree>
+    <p:extLst>
+      <p:ext uri="{BB962C8B-B14F-4D97-AF65-F5344CB8AC3E}">
+        <p14:creationId xmlns:p14="http://schemas.microsoft.com/office/powerpoint/2010/main" val="4029531985"/>
+      </p:ext>
+    </p:extLst>
+  </p:cSld>
+  <p:clrMapOvr>
+    <a:masterClrMapping/>
+  </p:clrMapOvr>
+</p:sld>
+</file>
+
+<file path=ppt/slides/slide3.xml><?xml version="1.0" encoding="utf-8"?>
+<p:sld xmlns:a="http://schemas.openxmlformats.org/drawingml/2006/main" xmlns:r="http://schemas.openxmlformats.org/officeDocument/2006/relationships" xmlns:p="http://schemas.openxmlformats.org/presentationml/2006/main">
+  <p:cSld>
+    <p:spTree>
+      <p:nvGrpSpPr>
+        <p:cNvPr id="1" name=""/>
+        <p:cNvGrpSpPr/>
+        <p:nvPr/>
+      </p:nvGrpSpPr>
+      <p:grpSpPr>
+        <a:xfrm>
+          <a:off x="0" y="0"/>
+          <a:ext cx="0" cy="0"/>
+          <a:chOff x="0" y="0"/>
+          <a:chExt cx="0" cy="0"/>
+        </a:xfrm>
+      </p:grpSpPr>
+      <p:sp>
+        <p:nvSpPr>
+          <p:cNvPr id="2" name="TextBox 1">
+            <a:extLst>
+              <a:ext uri="{FF2B5EF4-FFF2-40B4-BE49-F238E27FC236}">
+                <a16:creationId xmlns:a16="http://schemas.microsoft.com/office/drawing/2014/main" id="{EA99F039-9A9B-4C46-91C4-5F24DB6ABFCE}"/>
+              </a:ext>
+            </a:extLst>
+          </p:cNvPr>
+          <p:cNvSpPr txBox="1"/>
+          <p:nvPr/>
+        </p:nvSpPr>
+        <p:spPr>
+          <a:xfrm>
+            <a:off x="838199" y="291090"/>
+            <a:ext cx="10515599" cy="932688"/>
+          </a:xfrm>
+          <a:prstGeom prst="rect">
+            <a:avLst/>
+          </a:prstGeom>
+        </p:spPr>
+        <p:txBody>
+          <a:bodyPr vert="horz" lIns="91440" tIns="45720" rIns="91440" bIns="45720" rtlCol="0" anchor="b">
+            <a:normAutofit/>
+          </a:bodyPr>
+          <a:lstStyle/>
+          <a:p>
+            <a:pPr>
+              <a:lnSpc>
+                <a:spcPct val="90000"/>
+              </a:lnSpc>
+              <a:spcBef>
+                <a:spcPct val="0"/>
+              </a:spcBef>
+              <a:spcAft>
+                <a:spcPts val="600"/>
+              </a:spcAft>
+            </a:pPr>
+            <a:r>
+              <a:rPr lang="en-US" sz="5400" kern="1200" dirty="0">
+                <a:solidFill>
+                  <a:schemeClr val="tx1"/>
+                </a:solidFill>
+                <a:latin typeface="+mj-lt"/>
+                <a:ea typeface="+mj-ea"/>
+                <a:cs typeface="+mj-cs"/>
+              </a:rPr>
+              <a:t>Context and Generalizability</a:t>
+            </a:r>
+          </a:p>
+        </p:txBody>
+      </p:sp>
+      <p:sp>
+        <p:nvSpPr>
+          <p:cNvPr id="3" name="TextBox 2">
+            <a:extLst>
+              <a:ext uri="{FF2B5EF4-FFF2-40B4-BE49-F238E27FC236}">
+                <a16:creationId xmlns:a16="http://schemas.microsoft.com/office/drawing/2014/main" id="{C02D0B3F-B8AF-4BC5-ADAD-DC46CF9CD810}"/>
+              </a:ext>
+            </a:extLst>
+          </p:cNvPr>
+          <p:cNvSpPr txBox="1"/>
+          <p:nvPr/>
+        </p:nvSpPr>
+        <p:spPr>
+          <a:xfrm>
+            <a:off x="1066798" y="1780293"/>
+            <a:ext cx="10058400" cy="3539430"/>
+          </a:xfrm>
+          <a:prstGeom prst="rect">
+            <a:avLst/>
+          </a:prstGeom>
+          <a:noFill/>
+        </p:spPr>
+        <p:txBody>
+          <a:bodyPr wrap="square" rtlCol="0">
+            <a:spAutoFit/>
+          </a:bodyPr>
+          <a:lstStyle/>
+          <a:p>
+            <a:r>
+              <a:rPr lang="en-GB" sz="3200" b="1" dirty="0"/>
+              <a:t>The narrative NICE guidelines are open to interpretation</a:t>
+            </a:r>
+          </a:p>
+          <a:p>
+            <a:pPr marL="457200" indent="-457200">
+              <a:buFont typeface="Arial" panose="020B0604020202020204" pitchFamily="34" charset="0"/>
+              <a:buChar char="•"/>
+            </a:pPr>
+            <a:r>
+              <a:rPr lang="en-GB" sz="3200" dirty="0"/>
+              <a:t>They do not define assumptions regarding source data, thresholds, specific estimates used etc.</a:t>
+            </a:r>
+          </a:p>
+          <a:p>
+            <a:r>
+              <a:rPr lang="en-GB" sz="3200" b="1" dirty="0"/>
+              <a:t>Some SNOMED-CT codes are open to interpretation</a:t>
+            </a:r>
+          </a:p>
+          <a:p>
+            <a:pPr marL="457200" indent="-457200">
+              <a:buFont typeface="Arial" panose="020B0604020202020204" pitchFamily="34" charset="0"/>
+              <a:buChar char="•"/>
+            </a:pPr>
+            <a:r>
+              <a:rPr lang="en-GB" sz="3200" dirty="0"/>
+              <a:t>e.g. Codes for AKI risk and warning are not tied to a specific risk criteria.</a:t>
+            </a:r>
+          </a:p>
+          <a:p>
+            <a:endParaRPr lang="en-GB" sz="3200" dirty="0"/>
+          </a:p>
+        </p:txBody>
+      </p:sp>
+    </p:spTree>
+    <p:extLst>
+      <p:ext uri="{BB962C8B-B14F-4D97-AF65-F5344CB8AC3E}">
+        <p14:creationId xmlns:p14="http://schemas.microsoft.com/office/powerpoint/2010/main" val="2572149625"/>
+      </p:ext>
+    </p:extLst>
+  </p:cSld>
+  <p:clrMapOvr>
+    <a:masterClrMapping/>
+  </p:clrMapOvr>
+</p:sld>
+</file>
+
+<file path=ppt/slides/slide4.xml><?xml version="1.0" encoding="utf-8"?>
+<p:sld xmlns:a="http://schemas.openxmlformats.org/drawingml/2006/main" xmlns:r="http://schemas.openxmlformats.org/officeDocument/2006/relationships" xmlns:p="http://schemas.openxmlformats.org/presentationml/2006/main">
+  <p:cSld>
+    <p:spTree>
+      <p:nvGrpSpPr>
+        <p:cNvPr id="1" name=""/>
+        <p:cNvGrpSpPr/>
+        <p:nvPr/>
+      </p:nvGrpSpPr>
+      <p:grpSpPr>
+        <a:xfrm>
+          <a:off x="0" y="0"/>
+          <a:ext cx="0" cy="0"/>
+          <a:chOff x="0" y="0"/>
+          <a:chExt cx="0" cy="0"/>
+        </a:xfrm>
+      </p:grpSpPr>
+      <p:sp>
+        <p:nvSpPr>
+          <p:cNvPr id="4" name="TextBox 3">
+            <a:extLst>
+              <a:ext uri="{FF2B5EF4-FFF2-40B4-BE49-F238E27FC236}">
+                <a16:creationId xmlns:a16="http://schemas.microsoft.com/office/drawing/2014/main" id="{7E5BDBA5-B888-4FFF-BC67-C89AB9DB313A}"/>
+              </a:ext>
+            </a:extLst>
+          </p:cNvPr>
+          <p:cNvSpPr txBox="1"/>
+          <p:nvPr/>
+        </p:nvSpPr>
+        <p:spPr>
+          <a:xfrm>
+            <a:off x="838199" y="291090"/>
+            <a:ext cx="10515599" cy="932688"/>
+          </a:xfrm>
+          <a:prstGeom prst="rect">
+            <a:avLst/>
+          </a:prstGeom>
+        </p:spPr>
+        <p:txBody>
+          <a:bodyPr vert="horz" lIns="91440" tIns="45720" rIns="91440" bIns="45720" rtlCol="0" anchor="b">
+            <a:normAutofit/>
+          </a:bodyPr>
+          <a:lstStyle/>
+          <a:p>
+            <a:pPr>
+              <a:lnSpc>
+                <a:spcPct val="90000"/>
+              </a:lnSpc>
+              <a:spcBef>
+                <a:spcPct val="0"/>
+              </a:spcBef>
+              <a:spcAft>
+                <a:spcPts val="600"/>
+              </a:spcAft>
+            </a:pPr>
+            <a:r>
+              <a:rPr lang="en-US" sz="5400" dirty="0">
+                <a:latin typeface="+mj-lt"/>
+                <a:ea typeface="+mj-ea"/>
+                <a:cs typeface="+mj-cs"/>
+              </a:rPr>
+              <a:t>Our Assumptions</a:t>
+            </a:r>
+            <a:endParaRPr lang="en-US" sz="5400" kern="1200" dirty="0">
+              <a:solidFill>
+                <a:schemeClr val="tx1"/>
+              </a:solidFill>
+              <a:latin typeface="+mj-lt"/>
+              <a:ea typeface="+mj-ea"/>
+              <a:cs typeface="+mj-cs"/>
+            </a:endParaRPr>
+          </a:p>
+        </p:txBody>
+      </p:sp>
+      <p:sp>
+        <p:nvSpPr>
+          <p:cNvPr id="16" name="TextBox 15">
+            <a:extLst>
+              <a:ext uri="{FF2B5EF4-FFF2-40B4-BE49-F238E27FC236}">
+                <a16:creationId xmlns:a16="http://schemas.microsoft.com/office/drawing/2014/main" id="{34DFDE29-02C6-46BD-B018-7A1DF26D7E5D}"/>
+              </a:ext>
+            </a:extLst>
+          </p:cNvPr>
+          <p:cNvSpPr txBox="1"/>
+          <p:nvPr/>
+        </p:nvSpPr>
+        <p:spPr>
+          <a:xfrm>
+            <a:off x="1018903" y="1762005"/>
+            <a:ext cx="10058400" cy="3046988"/>
+          </a:xfrm>
+          <a:prstGeom prst="rect">
+            <a:avLst/>
+          </a:prstGeom>
+          <a:noFill/>
+        </p:spPr>
+        <p:txBody>
+          <a:bodyPr wrap="square" rtlCol="0">
+            <a:spAutoFit/>
+          </a:bodyPr>
+          <a:lstStyle/>
+          <a:p>
+            <a:pPr marL="285750" indent="-285750">
+              <a:buFont typeface="Arial" panose="020B0604020202020204" pitchFamily="34" charset="0"/>
+              <a:buChar char="•"/>
+            </a:pPr>
+            <a:r>
+              <a:rPr lang="en-GB" sz="3200" dirty="0"/>
+              <a:t>The dataset will be clean and complete (!)</a:t>
+            </a:r>
+          </a:p>
+          <a:p>
+            <a:pPr marL="285750" indent="-285750">
+              <a:buFont typeface="Arial" panose="020B0604020202020204" pitchFamily="34" charset="0"/>
+              <a:buChar char="•"/>
+            </a:pPr>
+            <a:r>
+              <a:rPr lang="en-GB" sz="3200" dirty="0"/>
+              <a:t>The dataset will include one creatinine reading per patient per calendar day.</a:t>
+            </a:r>
+          </a:p>
+          <a:p>
+            <a:pPr marL="285750" indent="-285750">
+              <a:buFont typeface="Arial" panose="020B0604020202020204" pitchFamily="34" charset="0"/>
+              <a:buChar char="•"/>
+            </a:pPr>
+            <a:r>
+              <a:rPr lang="en-GB" sz="3200" dirty="0"/>
+              <a:t>The threshold between adult/child will be 18 years.</a:t>
+            </a:r>
+          </a:p>
+          <a:p>
+            <a:pPr marL="285750" indent="-285750">
+              <a:buFont typeface="Arial" panose="020B0604020202020204" pitchFamily="34" charset="0"/>
+              <a:buChar char="•"/>
+            </a:pPr>
+            <a:r>
+              <a:rPr lang="en-GB" sz="3200" dirty="0"/>
+              <a:t>The eGFR values will be estimated by laboratory calculation (SCTID: 1107411000000104).</a:t>
+            </a:r>
+          </a:p>
+        </p:txBody>
+      </p:sp>
+    </p:spTree>
+    <p:extLst>
+      <p:ext uri="{BB962C8B-B14F-4D97-AF65-F5344CB8AC3E}">
+        <p14:creationId xmlns:p14="http://schemas.microsoft.com/office/powerpoint/2010/main" val="3412182844"/>
+      </p:ext>
+    </p:extLst>
+  </p:cSld>
+  <p:clrMapOvr>
+    <a:masterClrMapping/>
+  </p:clrMapOvr>
+</p:sld>
+</file>
+
+<file path=ppt/slides/slide5.xml><?xml version="1.0" encoding="utf-8"?>
+<p:sld xmlns:a="http://schemas.openxmlformats.org/drawingml/2006/main" xmlns:r="http://schemas.openxmlformats.org/officeDocument/2006/relationships" xmlns:p="http://schemas.openxmlformats.org/presentationml/2006/main">
+  <p:cSld>
+    <p:spTree>
+      <p:nvGrpSpPr>
+        <p:cNvPr id="1" name=""/>
+        <p:cNvGrpSpPr/>
+        <p:nvPr/>
+      </p:nvGrpSpPr>
+      <p:grpSpPr>
+        <a:xfrm>
+          <a:off x="0" y="0"/>
+          <a:ext cx="0" cy="0"/>
+          <a:chOff x="0" y="0"/>
+          <a:chExt cx="0" cy="0"/>
+        </a:xfrm>
+      </p:grpSpPr>
+      <p:pic>
+        <p:nvPicPr>
+          <p:cNvPr id="5" name="Picture 4" descr="Text&#10;&#10;Description automatically generated">
+            <a:extLst>
+              <a:ext uri="{FF2B5EF4-FFF2-40B4-BE49-F238E27FC236}">
+                <a16:creationId xmlns:a16="http://schemas.microsoft.com/office/drawing/2014/main" id="{C9611C1A-7B6D-449A-9647-89E299239679}"/>
+              </a:ext>
+            </a:extLst>
+          </p:cNvPr>
+          <p:cNvPicPr>
+            <a:picLocks noChangeAspect="1"/>
+          </p:cNvPicPr>
+          <p:nvPr/>
+        </p:nvPicPr>
+        <p:blipFill>
+          <a:blip r:embed="rId3">
+            <a:extLst>
+              <a:ext uri="{28A0092B-C50C-407E-A947-70E740481C1C}">
+                <a14:useLocalDpi xmlns:a14="http://schemas.microsoft.com/office/drawing/2010/main" val="0"/>
+              </a:ext>
+            </a:extLst>
+          </a:blip>
+          <a:stretch>
+            <a:fillRect/>
+          </a:stretch>
+        </p:blipFill>
+        <p:spPr>
+          <a:xfrm>
+            <a:off x="3195637" y="15721"/>
+            <a:ext cx="5799507" cy="6827991"/>
+          </a:xfrm>
+          <a:prstGeom prst="rect">
+            <a:avLst/>
+          </a:prstGeom>
+        </p:spPr>
+      </p:pic>
+    </p:spTree>
+    <p:extLst>
+      <p:ext uri="{BB962C8B-B14F-4D97-AF65-F5344CB8AC3E}">
+        <p14:creationId xmlns:p14="http://schemas.microsoft.com/office/powerpoint/2010/main" val="2068676291"/>
+      </p:ext>
+    </p:extLst>
+  </p:cSld>
+  <p:clrMapOvr>
+    <a:masterClrMapping/>
+  </p:clrMapOvr>
+</p:sld>
+</file>
+
+<file path=ppt/slides/slide6.xml><?xml version="1.0" encoding="utf-8"?>
+<p:sld xmlns:a="http://schemas.openxmlformats.org/drawingml/2006/main" xmlns:r="http://schemas.openxmlformats.org/officeDocument/2006/relationships" xmlns:p="http://schemas.openxmlformats.org/presentationml/2006/main">
+  <p:cSld>
+    <p:spTree>
+      <p:nvGrpSpPr>
+        <p:cNvPr id="1" name=""/>
+        <p:cNvGrpSpPr/>
+        <p:nvPr/>
+      </p:nvGrpSpPr>
+      <p:grpSpPr>
+        <a:xfrm>
+          <a:off x="0" y="0"/>
+          <a:ext cx="0" cy="0"/>
+          <a:chOff x="0" y="0"/>
+          <a:chExt cx="0" cy="0"/>
+        </a:xfrm>
+      </p:grpSpPr>
+      <p:sp>
+        <p:nvSpPr>
+          <p:cNvPr id="4" name="TextBox 3">
+            <a:extLst>
+              <a:ext uri="{FF2B5EF4-FFF2-40B4-BE49-F238E27FC236}">
+                <a16:creationId xmlns:a16="http://schemas.microsoft.com/office/drawing/2014/main" id="{7E5BDBA5-B888-4FFF-BC67-C89AB9DB313A}"/>
+              </a:ext>
+            </a:extLst>
+          </p:cNvPr>
+          <p:cNvSpPr txBox="1"/>
+          <p:nvPr/>
+        </p:nvSpPr>
+        <p:spPr>
+          <a:xfrm>
+            <a:off x="838199" y="291090"/>
+            <a:ext cx="10515599" cy="932688"/>
+          </a:xfrm>
+          <a:prstGeom prst="rect">
+            <a:avLst/>
+          </a:prstGeom>
+        </p:spPr>
+        <p:txBody>
+          <a:bodyPr vert="horz" lIns="91440" tIns="45720" rIns="91440" bIns="45720" rtlCol="0" anchor="b">
+            <a:normAutofit/>
+          </a:bodyPr>
+          <a:lstStyle/>
+          <a:p>
+            <a:pPr>
+              <a:lnSpc>
+                <a:spcPct val="90000"/>
+              </a:lnSpc>
+              <a:spcBef>
+                <a:spcPct val="0"/>
+              </a:spcBef>
+              <a:spcAft>
+                <a:spcPts val="600"/>
+              </a:spcAft>
+            </a:pPr>
+            <a:r>
+              <a:rPr lang="en-US" sz="5400" dirty="0">
+                <a:latin typeface="+mj-lt"/>
+                <a:ea typeface="+mj-ea"/>
+                <a:cs typeface="+mj-cs"/>
+              </a:rPr>
+              <a:t>CQL and FHIR Challenges</a:t>
+            </a:r>
+            <a:endParaRPr lang="en-US" sz="5400" kern="1200" dirty="0">
+              <a:solidFill>
+                <a:schemeClr val="tx1"/>
+              </a:solidFill>
+              <a:latin typeface="+mj-lt"/>
+              <a:ea typeface="+mj-ea"/>
+              <a:cs typeface="+mj-cs"/>
+            </a:endParaRPr>
+          </a:p>
+        </p:txBody>
+      </p:sp>
+      <p:sp>
+        <p:nvSpPr>
+          <p:cNvPr id="16" name="TextBox 15">
+            <a:extLst>
+              <a:ext uri="{FF2B5EF4-FFF2-40B4-BE49-F238E27FC236}">
+                <a16:creationId xmlns:a16="http://schemas.microsoft.com/office/drawing/2014/main" id="{34DFDE29-02C6-46BD-B018-7A1DF26D7E5D}"/>
+              </a:ext>
+            </a:extLst>
+          </p:cNvPr>
+          <p:cNvSpPr txBox="1"/>
+          <p:nvPr/>
+        </p:nvSpPr>
+        <p:spPr>
+          <a:xfrm>
+            <a:off x="1018903" y="1762005"/>
+            <a:ext cx="10058400" cy="4031873"/>
+          </a:xfrm>
+          <a:prstGeom prst="rect">
+            <a:avLst/>
+          </a:prstGeom>
+          <a:noFill/>
+        </p:spPr>
+        <p:txBody>
+          <a:bodyPr wrap="square" rtlCol="0">
+            <a:spAutoFit/>
+          </a:bodyPr>
+          <a:lstStyle/>
+          <a:p>
+            <a:r>
+              <a:rPr lang="en-GB" sz="3200" dirty="0"/>
+              <a:t>Comparing values across time intervals</a:t>
+            </a:r>
+          </a:p>
+          <a:p>
+            <a:pPr marL="742950" lvl="1" indent="-285750">
+              <a:buFont typeface="Arial" panose="020B0604020202020204" pitchFamily="34" charset="0"/>
+              <a:buChar char="•"/>
+            </a:pPr>
+            <a:r>
+              <a:rPr lang="en-GB" sz="3200" dirty="0"/>
+              <a:t>User documentation not very user-friendly</a:t>
+            </a:r>
+          </a:p>
+          <a:p>
+            <a:pPr marL="742950" lvl="1" indent="-285750">
+              <a:buFont typeface="Arial" panose="020B0604020202020204" pitchFamily="34" charset="0"/>
+              <a:buChar char="•"/>
+            </a:pPr>
+            <a:r>
+              <a:rPr lang="en-GB" sz="3200" dirty="0"/>
+              <a:t>CQL is also used to refer to the Cassandra Query Language; searches need to specify HL7 CQL.</a:t>
+            </a:r>
+          </a:p>
+          <a:p>
+            <a:endParaRPr lang="en-GB" sz="3200" dirty="0"/>
+          </a:p>
+          <a:p>
+            <a:r>
+              <a:rPr lang="en-GB" sz="3200" dirty="0"/>
+              <a:t>Availability of suitable test data</a:t>
+            </a:r>
+          </a:p>
+          <a:p>
+            <a:pPr marL="457200" indent="-457200">
+              <a:buFont typeface="Arial" panose="020B0604020202020204" pitchFamily="34" charset="0"/>
+              <a:buChar char="•"/>
+            </a:pPr>
+            <a:r>
+              <a:rPr lang="en-GB" sz="3200" dirty="0"/>
+              <a:t>Would be useful to have some standard synthetic datasets to work with.</a:t>
+            </a:r>
+          </a:p>
+        </p:txBody>
+      </p:sp>
+    </p:spTree>
+    <p:extLst>
+      <p:ext uri="{BB962C8B-B14F-4D97-AF65-F5344CB8AC3E}">
+        <p14:creationId xmlns:p14="http://schemas.microsoft.com/office/powerpoint/2010/main" val="4120229691"/>
+      </p:ext>
+    </p:extLst>
+  </p:cSld>
+  <p:clrMapOvr>
+    <a:masterClrMapping/>
+  </p:clrMapOvr>
+</p:sld>
+</file>
+
+<file path=ppt/slides/slide7.xml><?xml version="1.0" encoding="utf-8"?>
+<p:sld xmlns:a="http://schemas.openxmlformats.org/drawingml/2006/main" xmlns:r="http://schemas.openxmlformats.org/officeDocument/2006/relationships" xmlns:p="http://schemas.openxmlformats.org/presentationml/2006/main">
+  <p:cSld>
+    <p:spTree>
+      <p:nvGrpSpPr>
+        <p:cNvPr id="1" name=""/>
+        <p:cNvGrpSpPr/>
+        <p:nvPr/>
+      </p:nvGrpSpPr>
+      <p:grpSpPr>
+        <a:xfrm>
+          <a:off x="0" y="0"/>
+          <a:ext cx="0" cy="0"/>
+          <a:chOff x="0" y="0"/>
+          <a:chExt cx="0" cy="0"/>
+        </a:xfrm>
+      </p:grpSpPr>
+      <p:sp>
+        <p:nvSpPr>
+          <p:cNvPr id="2" name="TextBox 1">
+            <a:extLst>
+              <a:ext uri="{FF2B5EF4-FFF2-40B4-BE49-F238E27FC236}">
+                <a16:creationId xmlns:a16="http://schemas.microsoft.com/office/drawing/2014/main" id="{EA99F039-9A9B-4C46-91C4-5F24DB6ABFCE}"/>
+              </a:ext>
+            </a:extLst>
+          </p:cNvPr>
+          <p:cNvSpPr txBox="1"/>
+          <p:nvPr/>
+        </p:nvSpPr>
+        <p:spPr>
+          <a:xfrm>
+            <a:off x="838199" y="291090"/>
+            <a:ext cx="10515599" cy="932688"/>
+          </a:xfrm>
+          <a:prstGeom prst="rect">
+            <a:avLst/>
+          </a:prstGeom>
+        </p:spPr>
+        <p:txBody>
+          <a:bodyPr vert="horz" lIns="91440" tIns="45720" rIns="91440" bIns="45720" rtlCol="0" anchor="b">
+            <a:normAutofit/>
+          </a:bodyPr>
+          <a:lstStyle/>
+          <a:p>
+            <a:pPr>
+              <a:lnSpc>
+                <a:spcPct val="90000"/>
+              </a:lnSpc>
+              <a:spcBef>
+                <a:spcPct val="0"/>
+              </a:spcBef>
+              <a:spcAft>
+                <a:spcPts val="600"/>
+              </a:spcAft>
+            </a:pPr>
+            <a:r>
+              <a:rPr lang="en-US" sz="5400" kern="1200" dirty="0">
+                <a:solidFill>
+                  <a:schemeClr val="tx1"/>
+                </a:solidFill>
+                <a:latin typeface="+mj-lt"/>
+                <a:ea typeface="+mj-ea"/>
+                <a:cs typeface="+mj-cs"/>
+              </a:rPr>
+              <a:t>Data Challenges</a:t>
+            </a:r>
+          </a:p>
+        </p:txBody>
+      </p:sp>
+      <p:sp>
+        <p:nvSpPr>
+          <p:cNvPr id="3" name="TextBox 2">
+            <a:extLst>
+              <a:ext uri="{FF2B5EF4-FFF2-40B4-BE49-F238E27FC236}">
+                <a16:creationId xmlns:a16="http://schemas.microsoft.com/office/drawing/2014/main" id="{C02D0B3F-B8AF-4BC5-ADAD-DC46CF9CD810}"/>
+              </a:ext>
+            </a:extLst>
+          </p:cNvPr>
+          <p:cNvSpPr txBox="1"/>
+          <p:nvPr/>
+        </p:nvSpPr>
+        <p:spPr>
+          <a:xfrm>
+            <a:off x="1066798" y="1780293"/>
+            <a:ext cx="10058400" cy="2062103"/>
+          </a:xfrm>
+          <a:prstGeom prst="rect">
+            <a:avLst/>
+          </a:prstGeom>
+          <a:noFill/>
+        </p:spPr>
+        <p:txBody>
+          <a:bodyPr wrap="square" rtlCol="0">
+            <a:spAutoFit/>
+          </a:bodyPr>
+          <a:lstStyle/>
+          <a:p>
+            <a:r>
+              <a:rPr lang="en-GB" sz="3200" b="1" dirty="0"/>
+              <a:t>Real world patient data can be messy and incomplete…</a:t>
+            </a:r>
+          </a:p>
+          <a:p>
+            <a:pPr marL="742950" lvl="1" indent="-285750">
+              <a:buFont typeface="Arial" panose="020B0604020202020204" pitchFamily="34" charset="0"/>
+              <a:buChar char="•"/>
+            </a:pPr>
+            <a:r>
+              <a:rPr lang="en-GB" sz="3200" dirty="0"/>
+              <a:t>Lab results (e.g. creatinine) are not always accurately timestamped.</a:t>
+            </a:r>
+          </a:p>
+          <a:p>
+            <a:pPr marL="742950" lvl="1" indent="-285750">
+              <a:buFont typeface="Arial" panose="020B0604020202020204" pitchFamily="34" charset="0"/>
+              <a:buChar char="•"/>
+            </a:pPr>
+            <a:r>
+              <a:rPr lang="en-GB" sz="3200" dirty="0"/>
+              <a:t>Creatinine assays may vary between labs.</a:t>
+            </a:r>
+          </a:p>
+        </p:txBody>
+      </p:sp>
+    </p:spTree>
+    <p:extLst>
+      <p:ext uri="{BB962C8B-B14F-4D97-AF65-F5344CB8AC3E}">
+        <p14:creationId xmlns:p14="http://schemas.microsoft.com/office/powerpoint/2010/main" val="1308647719"/>
+      </p:ext>
+    </p:extLst>
+  </p:cSld>
+  <p:clrMapOvr>
+    <a:masterClrMapping/>
+  </p:clrMapOvr>
+</p:sld>
+</file>
+
+<file path=ppt/slides/slide8.xml><?xml version="1.0" encoding="utf-8"?>
+<p:sld xmlns:a="http://schemas.openxmlformats.org/drawingml/2006/main" xmlns:r="http://schemas.openxmlformats.org/officeDocument/2006/relationships" xmlns:p="http://schemas.openxmlformats.org/presentationml/2006/main">
+  <p:cSld>
+    <p:spTree>
+      <p:nvGrpSpPr>
+        <p:cNvPr id="1" name=""/>
+        <p:cNvGrpSpPr/>
+        <p:nvPr/>
+      </p:nvGrpSpPr>
+      <p:grpSpPr>
+        <a:xfrm>
+          <a:off x="0" y="0"/>
+          <a:ext cx="0" cy="0"/>
+          <a:chOff x="0" y="0"/>
+          <a:chExt cx="0" cy="0"/>
+        </a:xfrm>
+      </p:grpSpPr>
+      <p:sp>
+        <p:nvSpPr>
+          <p:cNvPr id="2" name="TextBox 1">
+            <a:extLst>
+              <a:ext uri="{FF2B5EF4-FFF2-40B4-BE49-F238E27FC236}">
+                <a16:creationId xmlns:a16="http://schemas.microsoft.com/office/drawing/2014/main" id="{EA99F039-9A9B-4C46-91C4-5F24DB6ABFCE}"/>
+              </a:ext>
+            </a:extLst>
+          </p:cNvPr>
+          <p:cNvSpPr txBox="1"/>
+          <p:nvPr/>
+        </p:nvSpPr>
+        <p:spPr>
+          <a:xfrm>
+            <a:off x="838199" y="291090"/>
+            <a:ext cx="10515599" cy="932688"/>
+          </a:xfrm>
+          <a:prstGeom prst="rect">
+            <a:avLst/>
+          </a:prstGeom>
+        </p:spPr>
+        <p:txBody>
+          <a:bodyPr vert="horz" lIns="91440" tIns="45720" rIns="91440" bIns="45720" rtlCol="0" anchor="b">
+            <a:normAutofit/>
+          </a:bodyPr>
+          <a:lstStyle/>
+          <a:p>
+            <a:pPr>
+              <a:lnSpc>
+                <a:spcPct val="90000"/>
+              </a:lnSpc>
+              <a:spcBef>
+                <a:spcPct val="0"/>
+              </a:spcBef>
+              <a:spcAft>
+                <a:spcPts val="600"/>
+              </a:spcAft>
+            </a:pPr>
+            <a:r>
+              <a:rPr lang="en-US" sz="5400" dirty="0">
+                <a:latin typeface="+mj-lt"/>
+                <a:ea typeface="+mj-ea"/>
+                <a:cs typeface="+mj-cs"/>
+              </a:rPr>
+              <a:t>Summary</a:t>
+            </a:r>
+            <a:endParaRPr lang="en-US" sz="5400" kern="1200" dirty="0">
+              <a:solidFill>
+                <a:schemeClr val="tx1"/>
+              </a:solidFill>
+              <a:latin typeface="+mj-lt"/>
+              <a:ea typeface="+mj-ea"/>
+              <a:cs typeface="+mj-cs"/>
+            </a:endParaRPr>
+          </a:p>
+        </p:txBody>
+      </p:sp>
+      <p:sp>
+        <p:nvSpPr>
+          <p:cNvPr id="3" name="TextBox 2">
+            <a:extLst>
+              <a:ext uri="{FF2B5EF4-FFF2-40B4-BE49-F238E27FC236}">
+                <a16:creationId xmlns:a16="http://schemas.microsoft.com/office/drawing/2014/main" id="{C02D0B3F-B8AF-4BC5-ADAD-DC46CF9CD810}"/>
+              </a:ext>
+            </a:extLst>
+          </p:cNvPr>
+          <p:cNvSpPr txBox="1"/>
+          <p:nvPr/>
+        </p:nvSpPr>
+        <p:spPr>
+          <a:xfrm>
+            <a:off x="1066798" y="1780293"/>
+            <a:ext cx="10058400" cy="4524315"/>
+          </a:xfrm>
+          <a:prstGeom prst="rect">
+            <a:avLst/>
+          </a:prstGeom>
+          <a:noFill/>
+        </p:spPr>
+        <p:txBody>
+          <a:bodyPr wrap="square" rtlCol="0">
+            <a:spAutoFit/>
+          </a:bodyPr>
+          <a:lstStyle/>
+          <a:p>
+            <a:r>
+              <a:rPr lang="en-GB" sz="3200" b="1" dirty="0"/>
+              <a:t>CQL expressions have the potential to improve patient care when integrated into patient management systems.</a:t>
+            </a:r>
+          </a:p>
+          <a:p>
+            <a:endParaRPr lang="en-GB" sz="3200" b="1" dirty="0"/>
+          </a:p>
+          <a:p>
+            <a:r>
+              <a:rPr lang="en-GB" sz="3200" b="1" dirty="0"/>
+              <a:t>A better CQL test environment would facilitate broader adoption.</a:t>
+            </a:r>
+          </a:p>
+          <a:p>
+            <a:endParaRPr lang="en-GB" sz="3200" b="1" dirty="0"/>
+          </a:p>
+          <a:p>
+            <a:r>
+              <a:rPr lang="en-GB" sz="3200" b="1" dirty="0"/>
+              <a:t>Many of the barriers to implementation are not technical:</a:t>
+            </a:r>
+          </a:p>
+          <a:p>
+            <a:pPr marL="457200" indent="-457200">
+              <a:buFont typeface="Arial" panose="020B0604020202020204" pitchFamily="34" charset="0"/>
+              <a:buChar char="•"/>
+            </a:pPr>
+            <a:r>
+              <a:rPr lang="en-GB" sz="3200" dirty="0"/>
+              <a:t>Clinicians and support staff need to adopt working practices that result in robust datasets.</a:t>
+            </a:r>
+          </a:p>
+        </p:txBody>
+      </p:sp>
+    </p:spTree>
+    <p:extLst>
+      <p:ext uri="{BB962C8B-B14F-4D97-AF65-F5344CB8AC3E}">
+        <p14:creationId xmlns:p14="http://schemas.microsoft.com/office/powerpoint/2010/main" val="197753112"/>
+      </p:ext>
+    </p:extLst>
+  </p:cSld>
+  <p:clrMapOvr>
+    <a:masterClrMapping/>
+  </p:clrMapOvr>
+</p:sld>
+</file>
+
+<file path=ppt/slides/slide9.xml><?xml version="1.0" encoding="utf-8"?>
+<p:sld xmlns:a="http://schemas.openxmlformats.org/drawingml/2006/main" xmlns:r="http://schemas.openxmlformats.org/officeDocument/2006/relationships" xmlns:p="http://schemas.openxmlformats.org/presentationml/2006/main">
+  <p:cSld>
+    <p:spTree>
+      <p:nvGrpSpPr>
+        <p:cNvPr id="1" name=""/>
+        <p:cNvGrpSpPr/>
+        <p:nvPr/>
+      </p:nvGrpSpPr>
+      <p:grpSpPr>
+        <a:xfrm>
+          <a:off x="0" y="0"/>
+          <a:ext cx="0" cy="0"/>
+          <a:chOff x="0" y="0"/>
+          <a:chExt cx="0" cy="0"/>
+        </a:xfrm>
+      </p:grpSpPr>
+      <p:pic>
+        <p:nvPicPr>
+          <p:cNvPr id="3" name="Picture 2" descr="A person standing in front of a mirror posing for the camera&#10;&#10;Description automatically generated">
+            <a:extLst>
+              <a:ext uri="{FF2B5EF4-FFF2-40B4-BE49-F238E27FC236}">
+                <a16:creationId xmlns:a16="http://schemas.microsoft.com/office/drawing/2014/main" id="{04980864-0DC7-49CF-9210-E421B23C0256}"/>
+              </a:ext>
+            </a:extLst>
+          </p:cNvPr>
+          <p:cNvPicPr>
+            <a:picLocks noChangeAspect="1"/>
+          </p:cNvPicPr>
+          <p:nvPr/>
+        </p:nvPicPr>
+        <p:blipFill>
+          <a:blip r:embed="rId3">
+            <a:extLst>
+              <a:ext uri="{28A0092B-C50C-407E-A947-70E740481C1C}">
+                <a14:useLocalDpi xmlns:a14="http://schemas.microsoft.com/office/drawing/2010/main" val="0"/>
+              </a:ext>
+            </a:extLst>
+          </a:blip>
+          <a:stretch>
+            <a:fillRect/>
+          </a:stretch>
+        </p:blipFill>
+        <p:spPr>
+          <a:xfrm>
+            <a:off x="985837" y="438150"/>
+            <a:ext cx="10220325" cy="5981700"/>
+          </a:xfrm>
+          <a:prstGeom prst="rect">
+            <a:avLst/>
+          </a:prstGeom>
+        </p:spPr>
+      </p:pic>
+    </p:spTree>
+    <p:extLst>
+      <p:ext uri="{BB962C8B-B14F-4D97-AF65-F5344CB8AC3E}">
+        <p14:creationId xmlns:p14="http://schemas.microsoft.com/office/powerpoint/2010/main" val="2342833373"/>
       </p:ext>
     </p:extLst>
   </p:cSld>

</xml_diff>